<commit_message>
Updated Jupyter notebook and got som bits for the presentation
</commit_message>
<xml_diff>
--- a/Team4_presentation.pptx
+++ b/Team4_presentation.pptx
@@ -7,11 +7,16 @@
   <p:sldIdLst>
     <p:sldId id="256" r:id="rId2"/>
     <p:sldId id="257" r:id="rId3"/>
-    <p:sldId id="260" r:id="rId4"/>
-    <p:sldId id="261" r:id="rId5"/>
-    <p:sldId id="258" r:id="rId6"/>
-    <p:sldId id="259" r:id="rId7"/>
-    <p:sldId id="262" r:id="rId8"/>
+    <p:sldId id="263" r:id="rId4"/>
+    <p:sldId id="260" r:id="rId5"/>
+    <p:sldId id="261" r:id="rId6"/>
+    <p:sldId id="264" r:id="rId7"/>
+    <p:sldId id="265" r:id="rId8"/>
+    <p:sldId id="266" r:id="rId9"/>
+    <p:sldId id="267" r:id="rId10"/>
+    <p:sldId id="258" r:id="rId11"/>
+    <p:sldId id="259" r:id="rId12"/>
+    <p:sldId id="262" r:id="rId13"/>
   </p:sldIdLst>
   <p:sldSz cx="12192000" cy="6858000"/>
   <p:notesSz cx="6858000" cy="9144000"/>
@@ -110,6 +115,11 @@
       </a:defRPr>
     </a:lvl9pPr>
   </p:defaultTextStyle>
+  <p:extLst>
+    <p:ext uri="{EFAFB233-063F-42B5-8137-9DF3F51BA10A}">
+      <p15:sldGuideLst xmlns:p15="http://schemas.microsoft.com/office/powerpoint/2012/main"/>
+    </p:ext>
+  </p:extLst>
 </p:presentation>
 </file>
 
@@ -244,7 +254,7 @@
           <a:p>
             <a:fld id="{EB65F4EE-F3D7-455C-BB33-4BC65FADA455}" type="datetimeFigureOut">
               <a:rPr lang="en-GB" smtClean="0"/>
-              <a:t>30/04/2020</a:t>
+              <a:t>02/05/2020</a:t>
             </a:fld>
             <a:endParaRPr lang="en-GB"/>
           </a:p>
@@ -414,7 +424,7 @@
           <a:p>
             <a:fld id="{EB65F4EE-F3D7-455C-BB33-4BC65FADA455}" type="datetimeFigureOut">
               <a:rPr lang="en-GB" smtClean="0"/>
-              <a:t>30/04/2020</a:t>
+              <a:t>02/05/2020</a:t>
             </a:fld>
             <a:endParaRPr lang="en-GB"/>
           </a:p>
@@ -594,7 +604,7 @@
           <a:p>
             <a:fld id="{EB65F4EE-F3D7-455C-BB33-4BC65FADA455}" type="datetimeFigureOut">
               <a:rPr lang="en-GB" smtClean="0"/>
-              <a:t>30/04/2020</a:t>
+              <a:t>02/05/2020</a:t>
             </a:fld>
             <a:endParaRPr lang="en-GB"/>
           </a:p>
@@ -764,7 +774,7 @@
           <a:p>
             <a:fld id="{EB65F4EE-F3D7-455C-BB33-4BC65FADA455}" type="datetimeFigureOut">
               <a:rPr lang="en-GB" smtClean="0"/>
-              <a:t>30/04/2020</a:t>
+              <a:t>02/05/2020</a:t>
             </a:fld>
             <a:endParaRPr lang="en-GB"/>
           </a:p>
@@ -1010,7 +1020,7 @@
           <a:p>
             <a:fld id="{EB65F4EE-F3D7-455C-BB33-4BC65FADA455}" type="datetimeFigureOut">
               <a:rPr lang="en-GB" smtClean="0"/>
-              <a:t>30/04/2020</a:t>
+              <a:t>02/05/2020</a:t>
             </a:fld>
             <a:endParaRPr lang="en-GB"/>
           </a:p>
@@ -1242,7 +1252,7 @@
           <a:p>
             <a:fld id="{EB65F4EE-F3D7-455C-BB33-4BC65FADA455}" type="datetimeFigureOut">
               <a:rPr lang="en-GB" smtClean="0"/>
-              <a:t>30/04/2020</a:t>
+              <a:t>02/05/2020</a:t>
             </a:fld>
             <a:endParaRPr lang="en-GB"/>
           </a:p>
@@ -1609,7 +1619,7 @@
           <a:p>
             <a:fld id="{EB65F4EE-F3D7-455C-BB33-4BC65FADA455}" type="datetimeFigureOut">
               <a:rPr lang="en-GB" smtClean="0"/>
-              <a:t>30/04/2020</a:t>
+              <a:t>02/05/2020</a:t>
             </a:fld>
             <a:endParaRPr lang="en-GB"/>
           </a:p>
@@ -1727,7 +1737,7 @@
           <a:p>
             <a:fld id="{EB65F4EE-F3D7-455C-BB33-4BC65FADA455}" type="datetimeFigureOut">
               <a:rPr lang="en-GB" smtClean="0"/>
-              <a:t>30/04/2020</a:t>
+              <a:t>02/05/2020</a:t>
             </a:fld>
             <a:endParaRPr lang="en-GB"/>
           </a:p>
@@ -1822,7 +1832,7 @@
           <a:p>
             <a:fld id="{EB65F4EE-F3D7-455C-BB33-4BC65FADA455}" type="datetimeFigureOut">
               <a:rPr lang="en-GB" smtClean="0"/>
-              <a:t>30/04/2020</a:t>
+              <a:t>02/05/2020</a:t>
             </a:fld>
             <a:endParaRPr lang="en-GB"/>
           </a:p>
@@ -2099,7 +2109,7 @@
           <a:p>
             <a:fld id="{EB65F4EE-F3D7-455C-BB33-4BC65FADA455}" type="datetimeFigureOut">
               <a:rPr lang="en-GB" smtClean="0"/>
-              <a:t>30/04/2020</a:t>
+              <a:t>02/05/2020</a:t>
             </a:fld>
             <a:endParaRPr lang="en-GB"/>
           </a:p>
@@ -2352,7 +2362,7 @@
           <a:p>
             <a:fld id="{EB65F4EE-F3D7-455C-BB33-4BC65FADA455}" type="datetimeFigureOut">
               <a:rPr lang="en-GB" smtClean="0"/>
-              <a:t>30/04/2020</a:t>
+              <a:t>02/05/2020</a:t>
             </a:fld>
             <a:endParaRPr lang="en-GB"/>
           </a:p>
@@ -2565,7 +2575,7 @@
           <a:p>
             <a:fld id="{EB65F4EE-F3D7-455C-BB33-4BC65FADA455}" type="datetimeFigureOut">
               <a:rPr lang="en-GB" smtClean="0"/>
-              <a:t>30/04/2020</a:t>
+              <a:t>02/05/2020</a:t>
             </a:fld>
             <a:endParaRPr lang="en-GB"/>
           </a:p>
@@ -3032,6 +3042,293 @@
   <p:clrMapOvr>
     <a:masterClrMapping/>
   </p:clrMapOvr>
+  <p:timing>
+    <p:tnLst>
+      <p:par>
+        <p:cTn id="1" dur="indefinite" restart="never" nodeType="tmRoot"/>
+      </p:par>
+    </p:tnLst>
+  </p:timing>
+</p:sld>
+</file>
+
+<file path=ppt/slides/slide10.xml><?xml version="1.0" encoding="utf-8"?>
+<p:sld xmlns:a="http://schemas.openxmlformats.org/drawingml/2006/main" xmlns:r="http://schemas.openxmlformats.org/officeDocument/2006/relationships" xmlns:p="http://schemas.openxmlformats.org/presentationml/2006/main">
+  <p:cSld>
+    <p:spTree>
+      <p:nvGrpSpPr>
+        <p:cNvPr id="1" name=""/>
+        <p:cNvGrpSpPr/>
+        <p:nvPr/>
+      </p:nvGrpSpPr>
+      <p:grpSpPr>
+        <a:xfrm>
+          <a:off x="0" y="0"/>
+          <a:ext cx="0" cy="0"/>
+          <a:chOff x="0" y="0"/>
+          <a:chExt cx="0" cy="0"/>
+        </a:xfrm>
+      </p:grpSpPr>
+      <p:sp>
+        <p:nvSpPr>
+          <p:cNvPr id="2" name="Title 1"/>
+          <p:cNvSpPr>
+            <a:spLocks noGrp="1"/>
+          </p:cNvSpPr>
+          <p:nvPr>
+            <p:ph type="title"/>
+          </p:nvPr>
+        </p:nvSpPr>
+        <p:spPr/>
+        <p:txBody>
+          <a:bodyPr/>
+          <a:lstStyle/>
+          <a:p>
+            <a:r>
+              <a:rPr lang="en-GB" dirty="0" smtClean="0"/>
+              <a:t>Future </a:t>
+            </a:r>
+            <a:r>
+              <a:rPr lang="en-GB" dirty="0" smtClean="0"/>
+              <a:t>work/business </a:t>
+            </a:r>
+            <a:endParaRPr lang="en-GB" dirty="0"/>
+          </a:p>
+        </p:txBody>
+      </p:sp>
+      <p:sp>
+        <p:nvSpPr>
+          <p:cNvPr id="3" name="Content Placeholder 2"/>
+          <p:cNvSpPr>
+            <a:spLocks noGrp="1"/>
+          </p:cNvSpPr>
+          <p:nvPr>
+            <p:ph idx="1"/>
+          </p:nvPr>
+        </p:nvSpPr>
+        <p:spPr/>
+        <p:txBody>
+          <a:bodyPr/>
+          <a:lstStyle/>
+          <a:p>
+            <a:r>
+              <a:rPr lang="en-GB" dirty="0" smtClean="0"/>
+              <a:t>Data</a:t>
+            </a:r>
+          </a:p>
+          <a:p>
+            <a:pPr lvl="1"/>
+            <a:r>
+              <a:rPr lang="en-GB" dirty="0" smtClean="0"/>
+              <a:t>Could include more features like pre-existing conditions and history of breast cancer (improve model performance)</a:t>
+            </a:r>
+          </a:p>
+          <a:p>
+            <a:pPr lvl="1"/>
+            <a:r>
+              <a:rPr lang="en-GB" dirty="0" smtClean="0"/>
+              <a:t>Could fine-tune the model to fewer features, which could make data collection more easy (commercial advantage) show feature importance graph for best model</a:t>
+            </a:r>
+          </a:p>
+        </p:txBody>
+      </p:sp>
+    </p:spTree>
+    <p:extLst>
+      <p:ext uri="{BB962C8B-B14F-4D97-AF65-F5344CB8AC3E}">
+        <p14:creationId xmlns:p14="http://schemas.microsoft.com/office/powerpoint/2010/main" val="2806975647"/>
+      </p:ext>
+    </p:extLst>
+  </p:cSld>
+  <p:clrMapOvr>
+    <a:masterClrMapping/>
+  </p:clrMapOvr>
+</p:sld>
+</file>
+
+<file path=ppt/slides/slide11.xml><?xml version="1.0" encoding="utf-8"?>
+<p:sld xmlns:a="http://schemas.openxmlformats.org/drawingml/2006/main" xmlns:r="http://schemas.openxmlformats.org/officeDocument/2006/relationships" xmlns:p="http://schemas.openxmlformats.org/presentationml/2006/main">
+  <p:cSld>
+    <p:spTree>
+      <p:nvGrpSpPr>
+        <p:cNvPr id="1" name=""/>
+        <p:cNvGrpSpPr/>
+        <p:nvPr/>
+      </p:nvGrpSpPr>
+      <p:grpSpPr>
+        <a:xfrm>
+          <a:off x="0" y="0"/>
+          <a:ext cx="0" cy="0"/>
+          <a:chOff x="0" y="0"/>
+          <a:chExt cx="0" cy="0"/>
+        </a:xfrm>
+      </p:grpSpPr>
+      <p:sp>
+        <p:nvSpPr>
+          <p:cNvPr id="2" name="Title 1"/>
+          <p:cNvSpPr>
+            <a:spLocks noGrp="1"/>
+          </p:cNvSpPr>
+          <p:nvPr>
+            <p:ph type="title"/>
+          </p:nvPr>
+        </p:nvSpPr>
+        <p:spPr/>
+        <p:txBody>
+          <a:bodyPr/>
+          <a:lstStyle/>
+          <a:p>
+            <a:r>
+              <a:rPr lang="en-GB" dirty="0" smtClean="0"/>
+              <a:t>Thanks!		</a:t>
+            </a:r>
+            <a:endParaRPr lang="en-GB" dirty="0"/>
+          </a:p>
+        </p:txBody>
+      </p:sp>
+      <p:sp>
+        <p:nvSpPr>
+          <p:cNvPr id="3" name="Content Placeholder 2"/>
+          <p:cNvSpPr>
+            <a:spLocks noGrp="1"/>
+          </p:cNvSpPr>
+          <p:nvPr>
+            <p:ph idx="1"/>
+          </p:nvPr>
+        </p:nvSpPr>
+        <p:spPr/>
+        <p:txBody>
+          <a:bodyPr/>
+          <a:lstStyle/>
+          <a:p>
+            <a:r>
+              <a:rPr lang="en-GB" dirty="0" smtClean="0"/>
+              <a:t>Checkout our git repo, it has a full report with all the code we used and some extra bits</a:t>
+            </a:r>
+          </a:p>
+          <a:p>
+            <a:r>
+              <a:rPr lang="en-GB" dirty="0" smtClean="0"/>
+              <a:t>Questions</a:t>
+            </a:r>
+            <a:endParaRPr lang="en-GB" dirty="0"/>
+          </a:p>
+        </p:txBody>
+      </p:sp>
+    </p:spTree>
+    <p:extLst>
+      <p:ext uri="{BB962C8B-B14F-4D97-AF65-F5344CB8AC3E}">
+        <p14:creationId xmlns:p14="http://schemas.microsoft.com/office/powerpoint/2010/main" val="3026215899"/>
+      </p:ext>
+    </p:extLst>
+  </p:cSld>
+  <p:clrMapOvr>
+    <a:masterClrMapping/>
+  </p:clrMapOvr>
+</p:sld>
+</file>
+
+<file path=ppt/slides/slide12.xml><?xml version="1.0" encoding="utf-8"?>
+<p:sld xmlns:a="http://schemas.openxmlformats.org/drawingml/2006/main" xmlns:r="http://schemas.openxmlformats.org/officeDocument/2006/relationships" xmlns:p="http://schemas.openxmlformats.org/presentationml/2006/main">
+  <p:cSld>
+    <p:spTree>
+      <p:nvGrpSpPr>
+        <p:cNvPr id="1" name=""/>
+        <p:cNvGrpSpPr/>
+        <p:nvPr/>
+      </p:nvGrpSpPr>
+      <p:grpSpPr>
+        <a:xfrm>
+          <a:off x="0" y="0"/>
+          <a:ext cx="0" cy="0"/>
+          <a:chOff x="0" y="0"/>
+          <a:chExt cx="0" cy="0"/>
+        </a:xfrm>
+      </p:grpSpPr>
+      <p:sp>
+        <p:nvSpPr>
+          <p:cNvPr id="2" name="Title 1"/>
+          <p:cNvSpPr>
+            <a:spLocks noGrp="1"/>
+          </p:cNvSpPr>
+          <p:nvPr>
+            <p:ph type="title"/>
+          </p:nvPr>
+        </p:nvSpPr>
+        <p:spPr/>
+        <p:txBody>
+          <a:bodyPr/>
+          <a:lstStyle/>
+          <a:p>
+            <a:r>
+              <a:rPr lang="en-GB" dirty="0" smtClean="0"/>
+              <a:t>Slides with more advanced stuff for questions</a:t>
+            </a:r>
+            <a:endParaRPr lang="en-GB" dirty="0"/>
+          </a:p>
+        </p:txBody>
+      </p:sp>
+      <p:sp>
+        <p:nvSpPr>
+          <p:cNvPr id="3" name="Content Placeholder 2"/>
+          <p:cNvSpPr>
+            <a:spLocks noGrp="1"/>
+          </p:cNvSpPr>
+          <p:nvPr>
+            <p:ph idx="1"/>
+          </p:nvPr>
+        </p:nvSpPr>
+        <p:spPr/>
+        <p:txBody>
+          <a:bodyPr/>
+          <a:lstStyle/>
+          <a:p>
+            <a:r>
+              <a:rPr lang="en-GB" dirty="0" smtClean="0"/>
+              <a:t>Pics of how models worked, decision tree visualisation, </a:t>
+            </a:r>
+            <a:r>
+              <a:rPr lang="en-GB" dirty="0" err="1" smtClean="0"/>
+              <a:t>mlp</a:t>
+            </a:r>
+            <a:r>
+              <a:rPr lang="en-GB" dirty="0" smtClean="0"/>
+              <a:t> neural network description, </a:t>
+            </a:r>
+            <a:r>
+              <a:rPr lang="en-GB" dirty="0" err="1" smtClean="0"/>
+              <a:t>etc</a:t>
+            </a:r>
+            <a:endParaRPr lang="en-GB" dirty="0" smtClean="0"/>
+          </a:p>
+          <a:p>
+            <a:r>
+              <a:rPr lang="en-GB" dirty="0" smtClean="0"/>
+              <a:t>Other feature importance graphs </a:t>
+            </a:r>
+            <a:endParaRPr lang="en-GB" dirty="0"/>
+          </a:p>
+          <a:p>
+            <a:pPr marL="0" indent="0">
+              <a:buNone/>
+            </a:pPr>
+            <a:r>
+              <a:rPr lang="en-GB" dirty="0" smtClean="0"/>
+              <a:t>- Slides to help with explaining how models work</a:t>
+            </a:r>
+            <a:endParaRPr lang="en-GB" dirty="0"/>
+          </a:p>
+        </p:txBody>
+      </p:sp>
+    </p:spTree>
+    <p:extLst>
+      <p:ext uri="{BB962C8B-B14F-4D97-AF65-F5344CB8AC3E}">
+        <p14:creationId xmlns:p14="http://schemas.microsoft.com/office/powerpoint/2010/main" val="4128399314"/>
+      </p:ext>
+    </p:extLst>
+  </p:cSld>
+  <p:clrMapOvr>
+    <a:masterClrMapping/>
+  </p:clrMapOvr>
 </p:sld>
 </file>
 
@@ -3093,7 +3390,7 @@
         </p:spPr>
         <p:txBody>
           <a:bodyPr>
-            <a:normAutofit lnSpcReduction="10000"/>
+            <a:normAutofit/>
           </a:bodyPr>
           <a:lstStyle/>
           <a:p>
@@ -3115,66 +3412,24 @@
               <a:rPr lang="en-GB" dirty="0" smtClean="0"/>
               <a:t>Histogram showing distribution of some features?</a:t>
             </a:r>
-            <a:endParaRPr lang="en-GB" dirty="0" smtClean="0"/>
           </a:p>
           <a:p>
             <a:pPr lvl="1"/>
             <a:r>
               <a:rPr lang="en-GB" dirty="0" smtClean="0"/>
-              <a:t>Quick example with oval and radius</a:t>
-            </a:r>
-            <a:endParaRPr lang="en-GB" dirty="0" smtClean="0"/>
-          </a:p>
-          <a:p>
+              <a:t>Quick example with oval and </a:t>
+            </a:r>
             <a:r>
               <a:rPr lang="en-GB" dirty="0" smtClean="0"/>
-              <a:t>Flow chart on preprocessing</a:t>
+              <a:t>radius</a:t>
             </a:r>
           </a:p>
           <a:p>
             <a:pPr lvl="1"/>
             <a:r>
               <a:rPr lang="en-GB" dirty="0" smtClean="0"/>
-              <a:t>Check for missing data</a:t>
-            </a:r>
-          </a:p>
-          <a:p>
-            <a:pPr lvl="1"/>
-            <a:r>
-              <a:rPr lang="en-GB" dirty="0" smtClean="0"/>
-              <a:t>Dealing with outliers</a:t>
-            </a:r>
-          </a:p>
-          <a:p>
-            <a:pPr lvl="1"/>
-            <a:r>
-              <a:rPr lang="en-GB" dirty="0" smtClean="0"/>
-              <a:t>Encoding categorical data</a:t>
-            </a:r>
-          </a:p>
-          <a:p>
-            <a:pPr lvl="1"/>
-            <a:r>
-              <a:rPr lang="en-GB" dirty="0" smtClean="0"/>
-              <a:t>Feature scaling</a:t>
-            </a:r>
-          </a:p>
-          <a:p>
-            <a:pPr lvl="1"/>
-            <a:r>
-              <a:rPr lang="en-GB" dirty="0" smtClean="0"/>
-              <a:t>Splitting the data</a:t>
-            </a:r>
-          </a:p>
-          <a:p>
-            <a:pPr lvl="1"/>
-            <a:r>
-              <a:rPr lang="en-GB" dirty="0" smtClean="0"/>
-              <a:t>Determining the threshold</a:t>
-            </a:r>
-          </a:p>
-          <a:p>
-            <a:pPr lvl="1"/>
+              <a:t>Sample size, M and B numbers, test/train size</a:t>
+            </a:r>
             <a:endParaRPr lang="en-GB" dirty="0" smtClean="0"/>
           </a:p>
           <a:p>
@@ -3211,6 +3466,46 @@
           </a:prstGeom>
         </p:spPr>
       </p:pic>
+      <p:sp>
+        <p:nvSpPr>
+          <p:cNvPr id="5" name="Oval 4"/>
+          <p:cNvSpPr/>
+          <p:nvPr/>
+        </p:nvSpPr>
+        <p:spPr>
+          <a:xfrm>
+            <a:off x="1548063" y="3981242"/>
+            <a:ext cx="7042485" cy="1917031"/>
+          </a:xfrm>
+          <a:prstGeom prst="ellipse">
+            <a:avLst/>
+          </a:prstGeom>
+        </p:spPr>
+        <p:style>
+          <a:lnRef idx="2">
+            <a:schemeClr val="accent1">
+              <a:shade val="50000"/>
+            </a:schemeClr>
+          </a:lnRef>
+          <a:fillRef idx="1">
+            <a:schemeClr val="accent1"/>
+          </a:fillRef>
+          <a:effectRef idx="0">
+            <a:schemeClr val="accent1"/>
+          </a:effectRef>
+          <a:fontRef idx="minor">
+            <a:schemeClr val="lt1"/>
+          </a:fontRef>
+        </p:style>
+        <p:txBody>
+          <a:bodyPr rtlCol="0" anchor="ctr"/>
+          <a:lstStyle/>
+          <a:p>
+            <a:pPr algn="ctr"/>
+            <a:endParaRPr lang="en-GB"/>
+          </a:p>
+        </p:txBody>
+      </p:sp>
     </p:spTree>
     <p:extLst>
       <p:ext uri="{BB962C8B-B14F-4D97-AF65-F5344CB8AC3E}">
@@ -3221,6 +3516,13 @@
   <p:clrMapOvr>
     <a:masterClrMapping/>
   </p:clrMapOvr>
+  <p:timing>
+    <p:tnLst>
+      <p:par>
+        <p:cTn id="1" dur="indefinite" restart="never" nodeType="tmRoot"/>
+      </p:par>
+    </p:tnLst>
+  </p:timing>
 </p:sld>
 </file>
 
@@ -3258,7 +3560,7 @@
           <a:p>
             <a:r>
               <a:rPr lang="en-GB" dirty="0" smtClean="0"/>
-              <a:t>The models</a:t>
+              <a:t>Flow chart</a:t>
             </a:r>
             <a:endParaRPr lang="en-GB" dirty="0"/>
           </a:p>
@@ -3279,31 +3581,58 @@
           <a:bodyPr/>
           <a:lstStyle/>
           <a:p>
-            <a:pPr marL="0" indent="0">
-              <a:buNone/>
-            </a:pPr>
-            <a:r>
-              <a:rPr lang="en-GB" dirty="0" smtClean="0"/>
-              <a:t>Flow chart again?</a:t>
-            </a:r>
-          </a:p>
-          <a:p>
-            <a:r>
-              <a:rPr lang="en-GB" dirty="0" smtClean="0"/>
-              <a:t>Trained four models</a:t>
-            </a:r>
-          </a:p>
-          <a:p>
-            <a:r>
-              <a:rPr lang="en-GB" dirty="0" smtClean="0"/>
-              <a:t>Maximised each of them to achieve highest precision by using an algorithm which tests loads of different versions and picks the best</a:t>
-            </a:r>
-          </a:p>
-          <a:p>
-            <a:r>
-              <a:rPr lang="en-GB" dirty="0" smtClean="0"/>
-              <a:t>Checked how good they were with our test data</a:t>
-            </a:r>
+            <a:r>
+              <a:rPr lang="en-GB" dirty="0"/>
+              <a:t>Flow chart on preprocessing</a:t>
+            </a:r>
+          </a:p>
+          <a:p>
+            <a:pPr lvl="1"/>
+            <a:r>
+              <a:rPr lang="en-GB" dirty="0"/>
+              <a:t>Check for missing data</a:t>
+            </a:r>
+          </a:p>
+          <a:p>
+            <a:pPr lvl="1"/>
+            <a:r>
+              <a:rPr lang="en-GB" dirty="0"/>
+              <a:t>Dealing with outliers</a:t>
+            </a:r>
+          </a:p>
+          <a:p>
+            <a:pPr lvl="1"/>
+            <a:r>
+              <a:rPr lang="en-GB" dirty="0"/>
+              <a:t>Encoding categorical data</a:t>
+            </a:r>
+          </a:p>
+          <a:p>
+            <a:pPr lvl="1"/>
+            <a:r>
+              <a:rPr lang="en-GB" dirty="0"/>
+              <a:t>Feature scaling</a:t>
+            </a:r>
+          </a:p>
+          <a:p>
+            <a:pPr lvl="1"/>
+            <a:r>
+              <a:rPr lang="en-GB" dirty="0"/>
+              <a:t>Splitting the data</a:t>
+            </a:r>
+          </a:p>
+          <a:p>
+            <a:pPr lvl="1"/>
+            <a:r>
+              <a:rPr lang="en-GB" dirty="0"/>
+              <a:t>Determining the threshold</a:t>
+            </a:r>
+          </a:p>
+          <a:p>
+            <a:pPr lvl="1"/>
+            <a:endParaRPr lang="en-GB" dirty="0"/>
+          </a:p>
+          <a:p>
             <a:endParaRPr lang="en-GB" dirty="0"/>
           </a:p>
         </p:txBody>
@@ -3311,7 +3640,7 @@
     </p:spTree>
     <p:extLst>
       <p:ext uri="{BB962C8B-B14F-4D97-AF65-F5344CB8AC3E}">
-        <p14:creationId xmlns:p14="http://schemas.microsoft.com/office/powerpoint/2010/main" val="3709800649"/>
+        <p14:creationId xmlns:p14="http://schemas.microsoft.com/office/powerpoint/2010/main" val="1880730299"/>
       </p:ext>
     </p:extLst>
   </p:cSld>
@@ -3355,7 +3684,7 @@
           <a:p>
             <a:r>
               <a:rPr lang="en-GB" dirty="0" smtClean="0"/>
-              <a:t>Model comparison</a:t>
+              <a:t>The models</a:t>
             </a:r>
             <a:endParaRPr lang="en-GB" dirty="0"/>
           </a:p>
@@ -3376,30 +3705,31 @@
           <a:bodyPr/>
           <a:lstStyle/>
           <a:p>
+            <a:pPr marL="0" indent="0">
+              <a:buNone/>
+            </a:pPr>
             <a:r>
               <a:rPr lang="en-GB" dirty="0" smtClean="0"/>
-              <a:t>Accuracy, precision and AUC are all measures of how good a model is, the closer they are to 1 (or 100%) the better the model</a:t>
+              <a:t>Flow chart again?</a:t>
             </a:r>
           </a:p>
           <a:p>
             <a:r>
               <a:rPr lang="en-GB" dirty="0" smtClean="0"/>
-              <a:t>Look at the four confusion matrices – brief explanation of what they are (with visual?), then all four compared directly</a:t>
+              <a:t>Trained four models</a:t>
             </a:r>
           </a:p>
           <a:p>
             <a:r>
               <a:rPr lang="en-GB" dirty="0" smtClean="0"/>
-              <a:t>Compare accuracy and precision with graph</a:t>
+              <a:t>Maximised each of them to achieve highest precision by using an algorithm which tests loads of different versions and picks the best</a:t>
             </a:r>
           </a:p>
           <a:p>
             <a:r>
               <a:rPr lang="en-GB" dirty="0" smtClean="0"/>
-              <a:t>Either have AUC on above graph too, or have ROC curve comparison (could have this in an appendix slide in case question is asked)</a:t>
-            </a:r>
-          </a:p>
-          <a:p>
+              <a:t>Checked how good they were with our test data</a:t>
+            </a:r>
             <a:endParaRPr lang="en-GB" dirty="0"/>
           </a:p>
         </p:txBody>
@@ -3407,13 +3737,20 @@
     </p:spTree>
     <p:extLst>
       <p:ext uri="{BB962C8B-B14F-4D97-AF65-F5344CB8AC3E}">
-        <p14:creationId xmlns:p14="http://schemas.microsoft.com/office/powerpoint/2010/main" val="381671034"/>
+        <p14:creationId xmlns:p14="http://schemas.microsoft.com/office/powerpoint/2010/main" val="3709800649"/>
       </p:ext>
     </p:extLst>
   </p:cSld>
   <p:clrMapOvr>
     <a:masterClrMapping/>
   </p:clrMapOvr>
+  <p:timing>
+    <p:tnLst>
+      <p:par>
+        <p:cTn id="1" dur="indefinite" restart="never" nodeType="tmRoot"/>
+      </p:par>
+    </p:tnLst>
+  </p:timing>
 </p:sld>
 </file>
 
@@ -3451,7 +3788,7 @@
           <a:p>
             <a:r>
               <a:rPr lang="en-GB" dirty="0" smtClean="0"/>
-              <a:t>Future work</a:t>
+              <a:t>Model comparison</a:t>
             </a:r>
             <a:endParaRPr lang="en-GB" dirty="0"/>
           </a:p>
@@ -3474,29 +3811,36 @@
           <a:p>
             <a:r>
               <a:rPr lang="en-GB" dirty="0" smtClean="0"/>
-              <a:t>Data</a:t>
-            </a:r>
-          </a:p>
-          <a:p>
-            <a:pPr lvl="1"/>
+              <a:t>Accuracy, precision and AUC are all measures of how good a model is, the closer they are to 1 (or 100%) the better the model</a:t>
+            </a:r>
+          </a:p>
+          <a:p>
             <a:r>
               <a:rPr lang="en-GB" dirty="0" smtClean="0"/>
-              <a:t>Could include more features like pre-existing conditions and history of breast cancer (improve model performance)</a:t>
-            </a:r>
-          </a:p>
-          <a:p>
-            <a:pPr lvl="1"/>
+              <a:t>Look at the four confusion matrices – brief explanation of what they are (with visual?), then all four compared directly</a:t>
+            </a:r>
+          </a:p>
+          <a:p>
             <a:r>
               <a:rPr lang="en-GB" dirty="0" smtClean="0"/>
-              <a:t>Could fine-tune the model to fewer features, which could make data collection more easy (commercial advantage) show feature importance graph for best model</a:t>
-            </a:r>
+              <a:t>Compare accuracy and precision with graph</a:t>
+            </a:r>
+          </a:p>
+          <a:p>
+            <a:r>
+              <a:rPr lang="en-GB" dirty="0" smtClean="0"/>
+              <a:t>Either have AUC on above graph too, or have ROC curve comparison (could have this in an appendix slide in case question is asked)</a:t>
+            </a:r>
+          </a:p>
+          <a:p>
+            <a:endParaRPr lang="en-GB" dirty="0"/>
           </a:p>
         </p:txBody>
       </p:sp>
     </p:spTree>
     <p:extLst>
       <p:ext uri="{BB962C8B-B14F-4D97-AF65-F5344CB8AC3E}">
-        <p14:creationId xmlns:p14="http://schemas.microsoft.com/office/powerpoint/2010/main" val="2806975647"/>
+        <p14:creationId xmlns:p14="http://schemas.microsoft.com/office/powerpoint/2010/main" val="381671034"/>
       </p:ext>
     </p:extLst>
   </p:cSld>
@@ -3540,7 +3884,7 @@
           <a:p>
             <a:r>
               <a:rPr lang="en-GB" dirty="0" smtClean="0"/>
-              <a:t>Thanks!		</a:t>
+              <a:t>Confusion matrix example</a:t>
             </a:r>
             <a:endParaRPr lang="en-GB" dirty="0"/>
           </a:p>
@@ -3561,24 +3905,14 @@
           <a:bodyPr/>
           <a:lstStyle/>
           <a:p>
-            <a:r>
-              <a:rPr lang="en-GB" dirty="0" smtClean="0"/>
-              <a:t>Checkout our git repo, it has a full report with all the code we used and some extra bits</a:t>
-            </a:r>
-          </a:p>
-          <a:p>
-            <a:r>
-              <a:rPr lang="en-GB" dirty="0" smtClean="0"/>
-              <a:t>Questions</a:t>
-            </a:r>
-            <a:endParaRPr lang="en-GB" dirty="0"/>
+            <a:endParaRPr lang="en-GB"/>
           </a:p>
         </p:txBody>
       </p:sp>
     </p:spTree>
     <p:extLst>
       <p:ext uri="{BB962C8B-B14F-4D97-AF65-F5344CB8AC3E}">
-        <p14:creationId xmlns:p14="http://schemas.microsoft.com/office/powerpoint/2010/main" val="3026215899"/>
+        <p14:creationId xmlns:p14="http://schemas.microsoft.com/office/powerpoint/2010/main" val="877201602"/>
       </p:ext>
     </p:extLst>
   </p:cSld>
@@ -3622,7 +3956,7 @@
           <a:p>
             <a:r>
               <a:rPr lang="en-GB" dirty="0" smtClean="0"/>
-              <a:t>Slides with more advanced stuff for questions</a:t>
+              <a:t>The actual confusion matrices</a:t>
             </a:r>
             <a:endParaRPr lang="en-GB" dirty="0"/>
           </a:p>
@@ -3643,37 +3977,162 @@
           <a:bodyPr/>
           <a:lstStyle/>
           <a:p>
-            <a:r>
-              <a:rPr lang="en-GB" dirty="0" smtClean="0"/>
-              <a:t>Pics of how models worked, decision tree visualisation, </a:t>
-            </a:r>
-            <a:r>
-              <a:rPr lang="en-GB" dirty="0" err="1" smtClean="0"/>
-              <a:t>mlp</a:t>
-            </a:r>
-            <a:r>
-              <a:rPr lang="en-GB" dirty="0" smtClean="0"/>
-              <a:t> neural network description, </a:t>
-            </a:r>
-            <a:r>
-              <a:rPr lang="en-GB" dirty="0" err="1" smtClean="0"/>
-              <a:t>etc</a:t>
-            </a:r>
-            <a:endParaRPr lang="en-GB" dirty="0" smtClean="0"/>
-          </a:p>
-          <a:p>
-            <a:r>
-              <a:rPr lang="en-GB" dirty="0" smtClean="0"/>
-              <a:t>Other feature importance graphs and </a:t>
-            </a:r>
-            <a:endParaRPr lang="en-GB" dirty="0"/>
+            <a:endParaRPr lang="en-GB"/>
           </a:p>
         </p:txBody>
       </p:sp>
     </p:spTree>
     <p:extLst>
       <p:ext uri="{BB962C8B-B14F-4D97-AF65-F5344CB8AC3E}">
-        <p14:creationId xmlns:p14="http://schemas.microsoft.com/office/powerpoint/2010/main" val="4128399314"/>
+        <p14:creationId xmlns:p14="http://schemas.microsoft.com/office/powerpoint/2010/main" val="4159094183"/>
+      </p:ext>
+    </p:extLst>
+  </p:cSld>
+  <p:clrMapOvr>
+    <a:masterClrMapping/>
+  </p:clrMapOvr>
+</p:sld>
+</file>
+
+<file path=ppt/slides/slide8.xml><?xml version="1.0" encoding="utf-8"?>
+<p:sld xmlns:a="http://schemas.openxmlformats.org/drawingml/2006/main" xmlns:r="http://schemas.openxmlformats.org/officeDocument/2006/relationships" xmlns:p="http://schemas.openxmlformats.org/presentationml/2006/main">
+  <p:cSld>
+    <p:spTree>
+      <p:nvGrpSpPr>
+        <p:cNvPr id="1" name=""/>
+        <p:cNvGrpSpPr/>
+        <p:nvPr/>
+      </p:nvGrpSpPr>
+      <p:grpSpPr>
+        <a:xfrm>
+          <a:off x="0" y="0"/>
+          <a:ext cx="0" cy="0"/>
+          <a:chOff x="0" y="0"/>
+          <a:chExt cx="0" cy="0"/>
+        </a:xfrm>
+      </p:grpSpPr>
+      <p:sp>
+        <p:nvSpPr>
+          <p:cNvPr id="2" name="Title 1"/>
+          <p:cNvSpPr>
+            <a:spLocks noGrp="1"/>
+          </p:cNvSpPr>
+          <p:nvPr>
+            <p:ph type="title"/>
+          </p:nvPr>
+        </p:nvSpPr>
+        <p:spPr/>
+        <p:txBody>
+          <a:bodyPr/>
+          <a:lstStyle/>
+          <a:p>
+            <a:r>
+              <a:rPr lang="en-GB" dirty="0" smtClean="0"/>
+              <a:t>Accuracy precision bar chart</a:t>
+            </a:r>
+            <a:endParaRPr lang="en-GB" dirty="0"/>
+          </a:p>
+        </p:txBody>
+      </p:sp>
+      <p:sp>
+        <p:nvSpPr>
+          <p:cNvPr id="3" name="Content Placeholder 2"/>
+          <p:cNvSpPr>
+            <a:spLocks noGrp="1"/>
+          </p:cNvSpPr>
+          <p:nvPr>
+            <p:ph idx="1"/>
+          </p:nvPr>
+        </p:nvSpPr>
+        <p:spPr/>
+        <p:txBody>
+          <a:bodyPr/>
+          <a:lstStyle/>
+          <a:p>
+            <a:endParaRPr lang="en-GB"/>
+          </a:p>
+        </p:txBody>
+      </p:sp>
+    </p:spTree>
+    <p:extLst>
+      <p:ext uri="{BB962C8B-B14F-4D97-AF65-F5344CB8AC3E}">
+        <p14:creationId xmlns:p14="http://schemas.microsoft.com/office/powerpoint/2010/main" val="3352798627"/>
+      </p:ext>
+    </p:extLst>
+  </p:cSld>
+  <p:clrMapOvr>
+    <a:masterClrMapping/>
+  </p:clrMapOvr>
+</p:sld>
+</file>
+
+<file path=ppt/slides/slide9.xml><?xml version="1.0" encoding="utf-8"?>
+<p:sld xmlns:a="http://schemas.openxmlformats.org/drawingml/2006/main" xmlns:r="http://schemas.openxmlformats.org/officeDocument/2006/relationships" xmlns:p="http://schemas.openxmlformats.org/presentationml/2006/main">
+  <p:cSld>
+    <p:spTree>
+      <p:nvGrpSpPr>
+        <p:cNvPr id="1" name=""/>
+        <p:cNvGrpSpPr/>
+        <p:nvPr/>
+      </p:nvGrpSpPr>
+      <p:grpSpPr>
+        <a:xfrm>
+          <a:off x="0" y="0"/>
+          <a:ext cx="0" cy="0"/>
+          <a:chOff x="0" y="0"/>
+          <a:chExt cx="0" cy="0"/>
+        </a:xfrm>
+      </p:grpSpPr>
+      <p:sp>
+        <p:nvSpPr>
+          <p:cNvPr id="2" name="Title 1"/>
+          <p:cNvSpPr>
+            <a:spLocks noGrp="1"/>
+          </p:cNvSpPr>
+          <p:nvPr>
+            <p:ph type="title"/>
+          </p:nvPr>
+        </p:nvSpPr>
+        <p:spPr/>
+        <p:txBody>
+          <a:bodyPr/>
+          <a:lstStyle/>
+          <a:p>
+            <a:r>
+              <a:rPr lang="en-GB" dirty="0" smtClean="0"/>
+              <a:t>Final recommendation </a:t>
+            </a:r>
+            <a:endParaRPr lang="en-GB" dirty="0"/>
+          </a:p>
+        </p:txBody>
+      </p:sp>
+      <p:sp>
+        <p:nvSpPr>
+          <p:cNvPr id="3" name="Content Placeholder 2"/>
+          <p:cNvSpPr>
+            <a:spLocks noGrp="1"/>
+          </p:cNvSpPr>
+          <p:nvPr>
+            <p:ph idx="1"/>
+          </p:nvPr>
+        </p:nvSpPr>
+        <p:spPr/>
+        <p:txBody>
+          <a:bodyPr/>
+          <a:lstStyle/>
+          <a:p>
+            <a:r>
+              <a:rPr lang="en-GB" dirty="0" smtClean="0"/>
+              <a:t>Explain why Random Forest is best</a:t>
+            </a:r>
+            <a:endParaRPr lang="en-GB" dirty="0"/>
+          </a:p>
+        </p:txBody>
+      </p:sp>
+    </p:spTree>
+    <p:extLst>
+      <p:ext uri="{BB962C8B-B14F-4D97-AF65-F5344CB8AC3E}">
+        <p14:creationId xmlns:p14="http://schemas.microsoft.com/office/powerpoint/2010/main" val="979333780"/>
       </p:ext>
     </p:extLst>
   </p:cSld>

</xml_diff>